<commit_message>
Alıştırma, sunum 4 güncelleme
</commit_message>
<xml_diff>
--- a/Sunum/4.pptx
+++ b/Sunum/4.pptx
@@ -7,6 +7,9 @@
   <p:notesMasterIdLst>
     <p:notesMasterId r:id="rId20"/>
   </p:notesMasterIdLst>
+  <p:handoutMasterIdLst>
+    <p:handoutMasterId r:id="rId21"/>
+  </p:handoutMasterIdLst>
   <p:sldIdLst>
     <p:sldId id="256" r:id="rId2"/>
     <p:sldId id="299" r:id="rId3"/>
@@ -130,6 +133,171 @@
     </p:ext>
   </p:extLst>
 </p:presentation>
+</file>
+
+<file path=ppt/handoutMasters/handoutMaster1.xml><?xml version="1.0" encoding="utf-8"?>
+<p:handoutMaster xmlns:a="http://schemas.openxmlformats.org/drawingml/2006/main" xmlns:r="http://schemas.openxmlformats.org/officeDocument/2006/relationships" xmlns:p="http://schemas.openxmlformats.org/presentationml/2006/main">
+  <p:cSld>
+    <p:bg>
+      <p:bgRef idx="1001">
+        <a:schemeClr val="bg1"/>
+      </p:bgRef>
+    </p:bg>
+    <p:spTree>
+      <p:nvGrpSpPr>
+        <p:cNvPr id="1" name=""/>
+        <p:cNvGrpSpPr/>
+        <p:nvPr/>
+      </p:nvGrpSpPr>
+      <p:grpSpPr>
+        <a:xfrm>
+          <a:off x="0" y="0"/>
+          <a:ext cx="0" cy="0"/>
+          <a:chOff x="0" y="0"/>
+          <a:chExt cx="0" cy="0"/>
+        </a:xfrm>
+      </p:grpSpPr>
+      <p:sp>
+        <p:nvSpPr>
+          <p:cNvPr id="2" name="Üstbilgi Yer Tutucusu 1"/>
+          <p:cNvSpPr>
+            <a:spLocks noGrp="1"/>
+          </p:cNvSpPr>
+          <p:nvPr>
+            <p:ph type="hdr" sz="quarter"/>
+          </p:nvPr>
+        </p:nvSpPr>
+        <p:spPr>
+          <a:xfrm>
+            <a:off x="0" y="0"/>
+            <a:ext cx="2971800" cy="458788"/>
+          </a:xfrm>
+          <a:prstGeom prst="rect">
+            <a:avLst/>
+          </a:prstGeom>
+        </p:spPr>
+        <p:txBody>
+          <a:bodyPr vert="horz" lIns="91440" tIns="45720" rIns="91440" bIns="45720" rtlCol="0"/>
+          <a:lstStyle>
+            <a:lvl1pPr algn="l">
+              <a:defRPr sz="1200"/>
+            </a:lvl1pPr>
+          </a:lstStyle>
+          <a:p>
+            <a:endParaRPr lang="tr-TR"/>
+          </a:p>
+        </p:txBody>
+      </p:sp>
+      <p:sp>
+        <p:nvSpPr>
+          <p:cNvPr id="3" name="Veri Yer Tutucusu 2"/>
+          <p:cNvSpPr>
+            <a:spLocks noGrp="1"/>
+          </p:cNvSpPr>
+          <p:nvPr>
+            <p:ph type="dt" sz="quarter" idx="1"/>
+          </p:nvPr>
+        </p:nvSpPr>
+        <p:spPr>
+          <a:xfrm>
+            <a:off x="3884613" y="0"/>
+            <a:ext cx="2971800" cy="458788"/>
+          </a:xfrm>
+          <a:prstGeom prst="rect">
+            <a:avLst/>
+          </a:prstGeom>
+        </p:spPr>
+        <p:txBody>
+          <a:bodyPr vert="horz" lIns="91440" tIns="45720" rIns="91440" bIns="45720" rtlCol="0"/>
+          <a:lstStyle>
+            <a:lvl1pPr algn="r">
+              <a:defRPr sz="1200"/>
+            </a:lvl1pPr>
+          </a:lstStyle>
+          <a:p>
+            <a:fld id="{F62564E5-544A-4A00-93CF-457E855E282C}" type="datetimeFigureOut">
+              <a:rPr lang="tr-TR" smtClean="0"/>
+              <a:t>11.03.2019</a:t>
+            </a:fld>
+            <a:endParaRPr lang="tr-TR"/>
+          </a:p>
+        </p:txBody>
+      </p:sp>
+      <p:sp>
+        <p:nvSpPr>
+          <p:cNvPr id="4" name="Altbilgi Yer Tutucusu 3"/>
+          <p:cNvSpPr>
+            <a:spLocks noGrp="1"/>
+          </p:cNvSpPr>
+          <p:nvPr>
+            <p:ph type="ftr" sz="quarter" idx="2"/>
+          </p:nvPr>
+        </p:nvSpPr>
+        <p:spPr>
+          <a:xfrm>
+            <a:off x="0" y="8685213"/>
+            <a:ext cx="2971800" cy="458787"/>
+          </a:xfrm>
+          <a:prstGeom prst="rect">
+            <a:avLst/>
+          </a:prstGeom>
+        </p:spPr>
+        <p:txBody>
+          <a:bodyPr vert="horz" lIns="91440" tIns="45720" rIns="91440" bIns="45720" rtlCol="0" anchor="b"/>
+          <a:lstStyle>
+            <a:lvl1pPr algn="l">
+              <a:defRPr sz="1200"/>
+            </a:lvl1pPr>
+          </a:lstStyle>
+          <a:p>
+            <a:endParaRPr lang="tr-TR"/>
+          </a:p>
+        </p:txBody>
+      </p:sp>
+      <p:sp>
+        <p:nvSpPr>
+          <p:cNvPr id="5" name="Slayt Numarası Yer Tutucusu 4"/>
+          <p:cNvSpPr>
+            <a:spLocks noGrp="1"/>
+          </p:cNvSpPr>
+          <p:nvPr>
+            <p:ph type="sldNum" sz="quarter" idx="3"/>
+          </p:nvPr>
+        </p:nvSpPr>
+        <p:spPr>
+          <a:xfrm>
+            <a:off x="3884613" y="8685213"/>
+            <a:ext cx="2971800" cy="458787"/>
+          </a:xfrm>
+          <a:prstGeom prst="rect">
+            <a:avLst/>
+          </a:prstGeom>
+        </p:spPr>
+        <p:txBody>
+          <a:bodyPr vert="horz" lIns="91440" tIns="45720" rIns="91440" bIns="45720" rtlCol="0" anchor="b"/>
+          <a:lstStyle>
+            <a:lvl1pPr algn="r">
+              <a:defRPr sz="1200"/>
+            </a:lvl1pPr>
+          </a:lstStyle>
+          <a:p>
+            <a:fld id="{ABFE2BD3-5A17-49CC-9292-E62C29CA9FBA}" type="slidenum">
+              <a:rPr lang="tr-TR" smtClean="0"/>
+              <a:t>‹#›</a:t>
+            </a:fld>
+            <a:endParaRPr lang="tr-TR"/>
+          </a:p>
+        </p:txBody>
+      </p:sp>
+    </p:spTree>
+    <p:extLst>
+      <p:ext uri="{BB962C8B-B14F-4D97-AF65-F5344CB8AC3E}">
+        <p14:creationId xmlns:p14="http://schemas.microsoft.com/office/powerpoint/2010/main" val="677165988"/>
+      </p:ext>
+    </p:extLst>
+  </p:cSld>
+  <p:clrMap bg1="lt1" tx1="dk1" bg2="lt2" tx2="dk2" accent1="accent1" accent2="accent2" accent3="accent3" accent4="accent4" accent5="accent5" accent6="accent6" hlink="hlink" folHlink="folHlink"/>
+</p:handoutMaster>
 </file>
 
 <file path=ppt/notesMasters/notesMaster1.xml><?xml version="1.0" encoding="utf-8"?>
@@ -577,7 +745,7 @@
           <a:effectLst/>
           <a:extLst>
             <a:ext uri="{91240B29-F687-4f45-9708-019B960494DF}">
-              <a14:hiddenLine xmlns:a14="http://schemas.microsoft.com/office/drawing/2010/main" xmlns="" w="9525">
+              <a14:hiddenLine xmlns="" xmlns:a14="http://schemas.microsoft.com/office/drawing/2010/main" w="9525">
                 <a:solidFill>
                   <a:srgbClr val="000000"/>
                 </a:solidFill>
@@ -2099,7 +2267,7 @@
           <a:ln/>
           <a:extLst>
             <a:ext uri="{91240B29-F687-4f45-9708-019B960494DF}">
-              <a14:hiddenLine xmlns:a14="http://schemas.microsoft.com/office/drawing/2010/main" xmlns="" w="9525">
+              <a14:hiddenLine xmlns="" xmlns:a14="http://schemas.microsoft.com/office/drawing/2010/main" w="9525">
                 <a:solidFill>
                   <a:srgbClr val="000000"/>
                 </a:solidFill>
@@ -2374,7 +2542,7 @@
           <a:ln/>
           <a:extLst>
             <a:ext uri="{91240B29-F687-4f45-9708-019B960494DF}">
-              <a14:hiddenLine xmlns:a14="http://schemas.microsoft.com/office/drawing/2010/main" xmlns="" w="9525">
+              <a14:hiddenLine xmlns="" xmlns:a14="http://schemas.microsoft.com/office/drawing/2010/main" w="9525">
                 <a:solidFill>
                   <a:srgbClr val="000000"/>
                 </a:solidFill>
@@ -2657,7 +2825,7 @@
           <a:ln/>
           <a:extLst>
             <a:ext uri="{91240B29-F687-4f45-9708-019B960494DF}">
-              <a14:hiddenLine xmlns:a14="http://schemas.microsoft.com/office/drawing/2010/main" xmlns="" w="9525">
+              <a14:hiddenLine xmlns="" xmlns:a14="http://schemas.microsoft.com/office/drawing/2010/main" w="9525">
                 <a:solidFill>
                   <a:srgbClr val="000000"/>
                 </a:solidFill>
@@ -3283,7 +3451,7 @@
           <a:ln/>
           <a:extLst>
             <a:ext uri="{91240B29-F687-4f45-9708-019B960494DF}">
-              <a14:hiddenLine xmlns:a14="http://schemas.microsoft.com/office/drawing/2010/main" xmlns="" w="9525">
+              <a14:hiddenLine xmlns="" xmlns:a14="http://schemas.microsoft.com/office/drawing/2010/main" w="9525">
                 <a:solidFill>
                   <a:srgbClr val="000000"/>
                 </a:solidFill>
@@ -3622,7 +3790,7 @@
           <a:ln/>
           <a:extLst>
             <a:ext uri="{91240B29-F687-4f45-9708-019B960494DF}">
-              <a14:hiddenLine xmlns:a14="http://schemas.microsoft.com/office/drawing/2010/main" xmlns="" w="9525">
+              <a14:hiddenLine xmlns="" xmlns:a14="http://schemas.microsoft.com/office/drawing/2010/main" w="9525">
                 <a:solidFill>
                   <a:srgbClr val="000000"/>
                 </a:solidFill>
@@ -4099,7 +4267,7 @@
           <a:ln/>
           <a:extLst>
             <a:ext uri="{91240B29-F687-4f45-9708-019B960494DF}">
-              <a14:hiddenLine xmlns:a14="http://schemas.microsoft.com/office/drawing/2010/main" xmlns="" w="9525">
+              <a14:hiddenLine xmlns="" xmlns:a14="http://schemas.microsoft.com/office/drawing/2010/main" w="9525">
                 <a:solidFill>
                   <a:srgbClr val="000000"/>
                 </a:solidFill>
@@ -4528,7 +4696,7 @@
           <a:ln/>
           <a:extLst>
             <a:ext uri="{91240B29-F687-4f45-9708-019B960494DF}">
-              <a14:hiddenLine xmlns:a14="http://schemas.microsoft.com/office/drawing/2010/main" xmlns="" w="9525">
+              <a14:hiddenLine xmlns="" xmlns:a14="http://schemas.microsoft.com/office/drawing/2010/main" w="9525">
                 <a:solidFill>
                   <a:srgbClr val="000000"/>
                 </a:solidFill>
@@ -6588,15 +6756,7 @@
             </a:pPr>
             <a:r>
               <a:rPr lang="tr-TR" dirty="0" smtClean="0"/>
-              <a:t>BGR ve HSV </a:t>
-            </a:r>
-            <a:r>
-              <a:rPr lang="tr-TR" dirty="0" smtClean="0"/>
-              <a:t>görüntüyü </a:t>
-            </a:r>
-            <a:r>
-              <a:rPr lang="tr-TR" dirty="0" smtClean="0"/>
-              <a:t>de </a:t>
+              <a:t>BGR ve HSV görüntüyü de </a:t>
             </a:r>
             <a:r>
               <a:rPr lang="tr-TR" dirty="0" err="1" smtClean="0"/>
@@ -6608,11 +6768,7 @@
             </a:r>
             <a:r>
               <a:rPr lang="tr-TR" smtClean="0"/>
-              <a:t>kanallarına </a:t>
-            </a:r>
-            <a:r>
-              <a:rPr lang="tr-TR" smtClean="0"/>
-              <a:t>ayır ve </a:t>
+              <a:t>kanallarına ayır ve </a:t>
             </a:r>
             <a:r>
               <a:rPr lang="tr-TR" dirty="0" smtClean="0"/>
@@ -7020,7 +7176,7 @@
           <a:p>
             <a:r>
               <a:rPr lang="tr-TR" dirty="0" smtClean="0"/>
-              <a:t>Kameradan Görüntü Alma</a:t>
+              <a:t>Pratik 4</a:t>
             </a:r>
             <a:endParaRPr lang="tr-TR" dirty="0"/>
           </a:p>
@@ -7036,15 +7192,175 @@
             <p:ph idx="1"/>
           </p:nvPr>
         </p:nvSpPr>
-        <p:spPr/>
+        <p:spPr>
+          <a:xfrm>
+            <a:off x="818712" y="2222287"/>
+            <a:ext cx="10554574" cy="4246246"/>
+          </a:xfrm>
+        </p:spPr>
         <p:txBody>
           <a:bodyPr/>
           <a:lstStyle/>
           <a:p>
+            <a:pPr marL="0" indent="0">
+              <a:buNone/>
+            </a:pPr>
             <a:r>
               <a:rPr lang="tr-TR" dirty="0" smtClean="0"/>
-              <a:t>Beraber yazalım</a:t>
-            </a:r>
+              <a:t>Kameradan görüntü alma, </a:t>
+            </a:r>
+            <a:r>
+              <a:rPr lang="tr-TR" dirty="0" err="1" smtClean="0"/>
+              <a:t>canny</a:t>
+            </a:r>
+            <a:r>
+              <a:rPr lang="tr-TR" dirty="0" smtClean="0"/>
+              <a:t>, morfolojik işlemler</a:t>
+            </a:r>
+            <a:endParaRPr lang="tr-TR" dirty="0" smtClean="0"/>
+          </a:p>
+          <a:p>
+            <a:pPr>
+              <a:buFont typeface="+mj-lt"/>
+              <a:buAutoNum type="arabicPeriod"/>
+            </a:pPr>
+            <a:endParaRPr lang="tr-TR" dirty="0" smtClean="0"/>
+          </a:p>
+          <a:p>
+            <a:pPr>
+              <a:buFont typeface="+mj-lt"/>
+              <a:buAutoNum type="arabicPeriod"/>
+            </a:pPr>
+            <a:r>
+              <a:rPr lang="tr-TR" dirty="0" smtClean="0"/>
+              <a:t>Kamera belirle ve aç</a:t>
+            </a:r>
+          </a:p>
+          <a:p>
+            <a:pPr>
+              <a:buFont typeface="+mj-lt"/>
+              <a:buAutoNum type="arabicPeriod"/>
+            </a:pPr>
+            <a:r>
+              <a:rPr lang="tr-TR" dirty="0" err="1" smtClean="0"/>
+              <a:t>While</a:t>
+            </a:r>
+            <a:r>
+              <a:rPr lang="tr-TR" dirty="0" smtClean="0"/>
+              <a:t> döngüsü başlat</a:t>
+            </a:r>
+            <a:endParaRPr lang="tr-TR" dirty="0" smtClean="0"/>
+          </a:p>
+          <a:p>
+            <a:pPr>
+              <a:buFont typeface="+mj-lt"/>
+              <a:buAutoNum type="arabicPeriod"/>
+            </a:pPr>
+            <a:r>
+              <a:rPr lang="tr-TR" dirty="0"/>
+              <a:t>K</a:t>
+            </a:r>
+            <a:r>
+              <a:rPr lang="tr-TR" dirty="0" smtClean="0"/>
+              <a:t>ameradan görüntü al ve göster</a:t>
+            </a:r>
+          </a:p>
+          <a:p>
+            <a:pPr>
+              <a:buFont typeface="+mj-lt"/>
+              <a:buAutoNum type="arabicPeriod"/>
+            </a:pPr>
+            <a:r>
+              <a:rPr lang="tr-TR" dirty="0" smtClean="0"/>
+              <a:t>Görüntüyü </a:t>
+            </a:r>
+            <a:r>
+              <a:rPr lang="tr-TR" dirty="0" err="1" smtClean="0"/>
+              <a:t>grayscale’a</a:t>
+            </a:r>
+            <a:r>
+              <a:rPr lang="tr-TR" dirty="0" smtClean="0"/>
+              <a:t> çevir ve göster</a:t>
+            </a:r>
+          </a:p>
+          <a:p>
+            <a:pPr>
+              <a:buFont typeface="+mj-lt"/>
+              <a:buAutoNum type="arabicPeriod"/>
+            </a:pPr>
+            <a:r>
+              <a:rPr lang="tr-TR" dirty="0" err="1" smtClean="0"/>
+              <a:t>Grayscale</a:t>
+            </a:r>
+            <a:r>
+              <a:rPr lang="tr-TR" dirty="0" smtClean="0"/>
+              <a:t> görüntüye </a:t>
+            </a:r>
+            <a:r>
+              <a:rPr lang="tr-TR" dirty="0" err="1" smtClean="0"/>
+              <a:t>canny</a:t>
+            </a:r>
+            <a:r>
+              <a:rPr lang="tr-TR" dirty="0" smtClean="0"/>
+              <a:t> uygula ve göster</a:t>
+            </a:r>
+          </a:p>
+          <a:p>
+            <a:pPr>
+              <a:buFont typeface="+mj-lt"/>
+              <a:buAutoNum type="arabicPeriod"/>
+            </a:pPr>
+            <a:r>
+              <a:rPr lang="tr-TR" dirty="0" err="1" smtClean="0"/>
+              <a:t>Canny</a:t>
+            </a:r>
+            <a:r>
+              <a:rPr lang="tr-TR" dirty="0" smtClean="0"/>
+              <a:t> uygulanmış görsele (5,5) </a:t>
+            </a:r>
+            <a:r>
+              <a:rPr lang="tr-TR" dirty="0" err="1" smtClean="0"/>
+              <a:t>kernel</a:t>
+            </a:r>
+            <a:r>
+              <a:rPr lang="tr-TR" dirty="0" smtClean="0"/>
+              <a:t> ile </a:t>
+            </a:r>
+            <a:r>
+              <a:rPr lang="tr-TR" dirty="0" err="1" smtClean="0"/>
+              <a:t>erosion</a:t>
+            </a:r>
+            <a:r>
+              <a:rPr lang="tr-TR" dirty="0" smtClean="0"/>
+              <a:t> ve </a:t>
+            </a:r>
+            <a:r>
+              <a:rPr lang="tr-TR" dirty="0" err="1" smtClean="0"/>
+              <a:t>dilation</a:t>
+            </a:r>
+            <a:r>
+              <a:rPr lang="tr-TR" dirty="0" smtClean="0"/>
+              <a:t> uygulayıp iki farklı görüntü elde et ve göster</a:t>
+            </a:r>
+          </a:p>
+          <a:p>
+            <a:pPr>
+              <a:buFont typeface="+mj-lt"/>
+              <a:buAutoNum type="arabicPeriod"/>
+            </a:pPr>
+            <a:r>
+              <a:rPr lang="tr-TR" dirty="0" smtClean="0"/>
+              <a:t>Döngünün son aşaması olarak </a:t>
+            </a:r>
+            <a:r>
+              <a:rPr lang="tr-TR" dirty="0" err="1" smtClean="0"/>
+              <a:t>waitKey</a:t>
+            </a:r>
+            <a:r>
+              <a:rPr lang="tr-TR" dirty="0" smtClean="0"/>
+              <a:t>(10) kullanmayı unutma (10 zorunlu olmasa bile küçük bir sayı girilmeli)</a:t>
+            </a:r>
+            <a:endParaRPr lang="tr-TR" dirty="0" smtClean="0"/>
           </a:p>
         </p:txBody>
       </p:sp>
@@ -14749,4 +15065,265 @@
     </a:ext>
   </a:extLst>
 </a:theme>
+</file>
+
+<file path=ppt/theme/theme3.xml><?xml version="1.0" encoding="utf-8"?>
+<a:theme xmlns:a="http://schemas.openxmlformats.org/drawingml/2006/main" name="Office Teması">
+  <a:themeElements>
+    <a:clrScheme name="Office">
+      <a:dk1>
+        <a:sysClr val="windowText" lastClr="000000"/>
+      </a:dk1>
+      <a:lt1>
+        <a:sysClr val="window" lastClr="FFFFFF"/>
+      </a:lt1>
+      <a:dk2>
+        <a:srgbClr val="44546A"/>
+      </a:dk2>
+      <a:lt2>
+        <a:srgbClr val="E7E6E6"/>
+      </a:lt2>
+      <a:accent1>
+        <a:srgbClr val="5B9BD5"/>
+      </a:accent1>
+      <a:accent2>
+        <a:srgbClr val="ED7D31"/>
+      </a:accent2>
+      <a:accent3>
+        <a:srgbClr val="A5A5A5"/>
+      </a:accent3>
+      <a:accent4>
+        <a:srgbClr val="FFC000"/>
+      </a:accent4>
+      <a:accent5>
+        <a:srgbClr val="4472C4"/>
+      </a:accent5>
+      <a:accent6>
+        <a:srgbClr val="70AD47"/>
+      </a:accent6>
+      <a:hlink>
+        <a:srgbClr val="0563C1"/>
+      </a:hlink>
+      <a:folHlink>
+        <a:srgbClr val="954F72"/>
+      </a:folHlink>
+    </a:clrScheme>
+    <a:fontScheme name="Office">
+      <a:majorFont>
+        <a:latin typeface="Calibri Light" panose="020F0302020204030204"/>
+        <a:ea typeface=""/>
+        <a:cs typeface=""/>
+        <a:font script="Jpan" typeface="ＭＳ Ｐゴシック"/>
+        <a:font script="Hang" typeface="맑은 고딕"/>
+        <a:font script="Hans" typeface="宋体"/>
+        <a:font script="Hant" typeface="新細明體"/>
+        <a:font script="Arab" typeface="Times New Roman"/>
+        <a:font script="Hebr" typeface="Times New Roman"/>
+        <a:font script="Thai" typeface="Angsana New"/>
+        <a:font script="Ethi" typeface="Nyala"/>
+        <a:font script="Beng" typeface="Vrinda"/>
+        <a:font script="Gujr" typeface="Shruti"/>
+        <a:font script="Khmr" typeface="MoolBoran"/>
+        <a:font script="Knda" typeface="Tunga"/>
+        <a:font script="Guru" typeface="Raavi"/>
+        <a:font script="Cans" typeface="Euphemia"/>
+        <a:font script="Cher" typeface="Plantagenet Cherokee"/>
+        <a:font script="Yiii" typeface="Microsoft Yi Baiti"/>
+        <a:font script="Tibt" typeface="Microsoft Himalaya"/>
+        <a:font script="Thaa" typeface="MV Boli"/>
+        <a:font script="Deva" typeface="Mangal"/>
+        <a:font script="Telu" typeface="Gautami"/>
+        <a:font script="Taml" typeface="Latha"/>
+        <a:font script="Syrc" typeface="Estrangelo Edessa"/>
+        <a:font script="Orya" typeface="Kalinga"/>
+        <a:font script="Mlym" typeface="Kartika"/>
+        <a:font script="Laoo" typeface="DokChampa"/>
+        <a:font script="Sinh" typeface="Iskoola Pota"/>
+        <a:font script="Mong" typeface="Mongolian Baiti"/>
+        <a:font script="Viet" typeface="Times New Roman"/>
+        <a:font script="Uigh" typeface="Microsoft Uighur"/>
+        <a:font script="Geor" typeface="Sylfaen"/>
+      </a:majorFont>
+      <a:minorFont>
+        <a:latin typeface="Calibri" panose="020F0502020204030204"/>
+        <a:ea typeface=""/>
+        <a:cs typeface=""/>
+        <a:font script="Jpan" typeface="ＭＳ Ｐゴシック"/>
+        <a:font script="Hang" typeface="맑은 고딕"/>
+        <a:font script="Hans" typeface="宋体"/>
+        <a:font script="Hant" typeface="新細明體"/>
+        <a:font script="Arab" typeface="Arial"/>
+        <a:font script="Hebr" typeface="Arial"/>
+        <a:font script="Thai" typeface="Cordia New"/>
+        <a:font script="Ethi" typeface="Nyala"/>
+        <a:font script="Beng" typeface="Vrinda"/>
+        <a:font script="Gujr" typeface="Shruti"/>
+        <a:font script="Khmr" typeface="DaunPenh"/>
+        <a:font script="Knda" typeface="Tunga"/>
+        <a:font script="Guru" typeface="Raavi"/>
+        <a:font script="Cans" typeface="Euphemia"/>
+        <a:font script="Cher" typeface="Plantagenet Cherokee"/>
+        <a:font script="Yiii" typeface="Microsoft Yi Baiti"/>
+        <a:font script="Tibt" typeface="Microsoft Himalaya"/>
+        <a:font script="Thaa" typeface="MV Boli"/>
+        <a:font script="Deva" typeface="Mangal"/>
+        <a:font script="Telu" typeface="Gautami"/>
+        <a:font script="Taml" typeface="Latha"/>
+        <a:font script="Syrc" typeface="Estrangelo Edessa"/>
+        <a:font script="Orya" typeface="Kalinga"/>
+        <a:font script="Mlym" typeface="Kartika"/>
+        <a:font script="Laoo" typeface="DokChampa"/>
+        <a:font script="Sinh" typeface="Iskoola Pota"/>
+        <a:font script="Mong" typeface="Mongolian Baiti"/>
+        <a:font script="Viet" typeface="Arial"/>
+        <a:font script="Uigh" typeface="Microsoft Uighur"/>
+        <a:font script="Geor" typeface="Sylfaen"/>
+      </a:minorFont>
+    </a:fontScheme>
+    <a:fmtScheme name="Office">
+      <a:fillStyleLst>
+        <a:solidFill>
+          <a:schemeClr val="phClr"/>
+        </a:solidFill>
+        <a:gradFill rotWithShape="1">
+          <a:gsLst>
+            <a:gs pos="0">
+              <a:schemeClr val="phClr">
+                <a:lumMod val="110000"/>
+                <a:satMod val="105000"/>
+                <a:tint val="67000"/>
+              </a:schemeClr>
+            </a:gs>
+            <a:gs pos="50000">
+              <a:schemeClr val="phClr">
+                <a:lumMod val="105000"/>
+                <a:satMod val="103000"/>
+                <a:tint val="73000"/>
+              </a:schemeClr>
+            </a:gs>
+            <a:gs pos="100000">
+              <a:schemeClr val="phClr">
+                <a:lumMod val="105000"/>
+                <a:satMod val="109000"/>
+                <a:tint val="81000"/>
+              </a:schemeClr>
+            </a:gs>
+          </a:gsLst>
+          <a:lin ang="5400000" scaled="0"/>
+        </a:gradFill>
+        <a:gradFill rotWithShape="1">
+          <a:gsLst>
+            <a:gs pos="0">
+              <a:schemeClr val="phClr">
+                <a:satMod val="103000"/>
+                <a:lumMod val="102000"/>
+                <a:tint val="94000"/>
+              </a:schemeClr>
+            </a:gs>
+            <a:gs pos="50000">
+              <a:schemeClr val="phClr">
+                <a:satMod val="110000"/>
+                <a:lumMod val="100000"/>
+                <a:shade val="100000"/>
+              </a:schemeClr>
+            </a:gs>
+            <a:gs pos="100000">
+              <a:schemeClr val="phClr">
+                <a:lumMod val="99000"/>
+                <a:satMod val="120000"/>
+                <a:shade val="78000"/>
+              </a:schemeClr>
+            </a:gs>
+          </a:gsLst>
+          <a:lin ang="5400000" scaled="0"/>
+        </a:gradFill>
+      </a:fillStyleLst>
+      <a:lnStyleLst>
+        <a:ln w="6350" cap="flat" cmpd="sng" algn="ctr">
+          <a:solidFill>
+            <a:schemeClr val="phClr"/>
+          </a:solidFill>
+          <a:prstDash val="solid"/>
+          <a:miter lim="800000"/>
+        </a:ln>
+        <a:ln w="12700" cap="flat" cmpd="sng" algn="ctr">
+          <a:solidFill>
+            <a:schemeClr val="phClr"/>
+          </a:solidFill>
+          <a:prstDash val="solid"/>
+          <a:miter lim="800000"/>
+        </a:ln>
+        <a:ln w="19050" cap="flat" cmpd="sng" algn="ctr">
+          <a:solidFill>
+            <a:schemeClr val="phClr"/>
+          </a:solidFill>
+          <a:prstDash val="solid"/>
+          <a:miter lim="800000"/>
+        </a:ln>
+      </a:lnStyleLst>
+      <a:effectStyleLst>
+        <a:effectStyle>
+          <a:effectLst/>
+        </a:effectStyle>
+        <a:effectStyle>
+          <a:effectLst/>
+        </a:effectStyle>
+        <a:effectStyle>
+          <a:effectLst>
+            <a:outerShdw blurRad="57150" dist="19050" dir="5400000" algn="ctr" rotWithShape="0">
+              <a:srgbClr val="000000">
+                <a:alpha val="63000"/>
+              </a:srgbClr>
+            </a:outerShdw>
+          </a:effectLst>
+        </a:effectStyle>
+      </a:effectStyleLst>
+      <a:bgFillStyleLst>
+        <a:solidFill>
+          <a:schemeClr val="phClr"/>
+        </a:solidFill>
+        <a:solidFill>
+          <a:schemeClr val="phClr">
+            <a:tint val="95000"/>
+            <a:satMod val="170000"/>
+          </a:schemeClr>
+        </a:solidFill>
+        <a:gradFill rotWithShape="1">
+          <a:gsLst>
+            <a:gs pos="0">
+              <a:schemeClr val="phClr">
+                <a:tint val="93000"/>
+                <a:satMod val="150000"/>
+                <a:shade val="98000"/>
+                <a:lumMod val="102000"/>
+              </a:schemeClr>
+            </a:gs>
+            <a:gs pos="50000">
+              <a:schemeClr val="phClr">
+                <a:tint val="98000"/>
+                <a:satMod val="130000"/>
+                <a:shade val="90000"/>
+                <a:lumMod val="103000"/>
+              </a:schemeClr>
+            </a:gs>
+            <a:gs pos="100000">
+              <a:schemeClr val="phClr">
+                <a:shade val="63000"/>
+                <a:satMod val="120000"/>
+              </a:schemeClr>
+            </a:gs>
+          </a:gsLst>
+          <a:lin ang="5400000" scaled="0"/>
+        </a:gradFill>
+      </a:bgFillStyleLst>
+    </a:fmtScheme>
+  </a:themeElements>
+  <a:objectDefaults/>
+  <a:extraClrSchemeLst/>
+  <a:extLst>
+    <a:ext uri="{05A4C25C-085E-4340-85A3-A5531E510DB2}">
+      <thm15:themeFamily xmlns:thm15="http://schemas.microsoft.com/office/thememl/2012/main" name="Office Theme" id="{62F939B6-93AF-4DB8-9C6B-D6C7DFDC589F}" vid="{4A3C46E8-61CC-4603-A589-7422A47A8E4A}"/>
+    </a:ext>
+  </a:extLst>
+</a:theme>
 </file>
</xml_diff>